<commit_message>
Minor cleanup in clh_rwlock and added spinlocks to mutex_validation
</commit_message>
<xml_diff>
--- a/Presentations/CLH-RWLock.pptx
+++ b/Presentations/CLH-RWLock.pptx
@@ -2875,7 +2875,7 @@
             <a:fld id="{1D8BD707-D9CF-40AE-B4C6-C98DA3205C09}" type="datetimeFigureOut">
               <a:rPr lang="en-US" smtClean="0"/>
               <a:pPr/>
-              <a:t>5/27/2014</a:t>
+              <a:t>6/8/2014</a:t>
             </a:fld>
             <a:endParaRPr lang="en-US"/>
           </a:p>
@@ -3162,7 +3162,7 @@
             <a:fld id="{1D8BD707-D9CF-40AE-B4C6-C98DA3205C09}" type="datetimeFigureOut">
               <a:rPr lang="en-US" smtClean="0"/>
               <a:pPr/>
-              <a:t>5/27/2014</a:t>
+              <a:t>6/8/2014</a:t>
             </a:fld>
             <a:endParaRPr lang="en-US"/>
           </a:p>
@@ -3339,7 +3339,7 @@
             <a:fld id="{1D8BD707-D9CF-40AE-B4C6-C98DA3205C09}" type="datetimeFigureOut">
               <a:rPr lang="en-US" smtClean="0"/>
               <a:pPr/>
-              <a:t>5/27/2014</a:t>
+              <a:t>6/8/2014</a:t>
             </a:fld>
             <a:endParaRPr lang="en-US"/>
           </a:p>
@@ -3506,7 +3506,7 @@
             <a:fld id="{1D8BD707-D9CF-40AE-B4C6-C98DA3205C09}" type="datetimeFigureOut">
               <a:rPr lang="en-US" smtClean="0"/>
               <a:pPr/>
-              <a:t>5/27/2014</a:t>
+              <a:t>6/8/2014</a:t>
             </a:fld>
             <a:endParaRPr lang="en-US"/>
           </a:p>
@@ -3749,7 +3749,7 @@
             <a:fld id="{1D8BD707-D9CF-40AE-B4C6-C98DA3205C09}" type="datetimeFigureOut">
               <a:rPr lang="en-US" smtClean="0"/>
               <a:pPr/>
-              <a:t>5/27/2014</a:t>
+              <a:t>6/8/2014</a:t>
             </a:fld>
             <a:endParaRPr lang="en-US"/>
           </a:p>
@@ -3864,7 +3864,7 @@
             <a:fld id="{1D8BD707-D9CF-40AE-B4C6-C98DA3205C09}" type="datetimeFigureOut">
               <a:rPr lang="en-US" smtClean="0"/>
               <a:pPr/>
-              <a:t>5/27/2014</a:t>
+              <a:t>6/8/2014</a:t>
             </a:fld>
             <a:endParaRPr lang="en-US"/>
           </a:p>
@@ -4405,7 +4405,7 @@
             <a:fld id="{1D8BD707-D9CF-40AE-B4C6-C98DA3205C09}" type="datetimeFigureOut">
               <a:rPr lang="en-US" smtClean="0"/>
               <a:pPr/>
-              <a:t>5/27/2014</a:t>
+              <a:t>6/8/2014</a:t>
             </a:fld>
             <a:endParaRPr lang="en-US"/>
           </a:p>
@@ -4520,7 +4520,7 @@
             <a:fld id="{1D8BD707-D9CF-40AE-B4C6-C98DA3205C09}" type="datetimeFigureOut">
               <a:rPr lang="en-US" smtClean="0"/>
               <a:pPr/>
-              <a:t>5/27/2014</a:t>
+              <a:t>6/8/2014</a:t>
             </a:fld>
             <a:endParaRPr lang="en-US"/>
           </a:p>
@@ -4612,7 +4612,7 @@
             <a:fld id="{1D8BD707-D9CF-40AE-B4C6-C98DA3205C09}" type="datetimeFigureOut">
               <a:rPr lang="en-US" smtClean="0"/>
               <a:pPr/>
-              <a:t>5/27/2014</a:t>
+              <a:t>6/8/2014</a:t>
             </a:fld>
             <a:endParaRPr lang="en-US"/>
           </a:p>
@@ -7265,7 +7265,7 @@
             <a:fld id="{1D8BD707-D9CF-40AE-B4C6-C98DA3205C09}" type="datetimeFigureOut">
               <a:rPr lang="en-US" smtClean="0"/>
               <a:pPr/>
-              <a:t>5/27/2014</a:t>
+              <a:t>6/8/2014</a:t>
             </a:fld>
             <a:endParaRPr lang="en-US"/>
           </a:p>
@@ -10479,7 +10479,7 @@
             <a:fld id="{1D8BD707-D9CF-40AE-B4C6-C98DA3205C09}" type="datetimeFigureOut">
               <a:rPr lang="en-US" smtClean="0"/>
               <a:pPr/>
-              <a:t>5/27/2014</a:t>
+              <a:t>6/8/2014</a:t>
             </a:fld>
             <a:endParaRPr lang="en-US"/>
           </a:p>
@@ -13303,7 +13303,7 @@
             <a:fld id="{1D8BD707-D9CF-40AE-B4C6-C98DA3205C09}" type="datetimeFigureOut">
               <a:rPr lang="en-US" smtClean="0"/>
               <a:pPr/>
-              <a:t>5/27/2014</a:t>
+              <a:t>6/8/2014</a:t>
             </a:fld>
             <a:endParaRPr lang="en-US"/>
           </a:p>
@@ -13781,11 +13781,7 @@
           <a:p>
             <a:r>
               <a:rPr lang="en-US" sz="3200" dirty="0" smtClean="0"/>
-              <a:t>CLH </a:t>
-            </a:r>
-            <a:r>
-              <a:rPr lang="en-US" sz="3200" dirty="0" smtClean="0"/>
-              <a:t>– Reader-Writer Lock</a:t>
+              <a:t>CLH – Reader-Writer Lock</a:t>
             </a:r>
             <a:endParaRPr lang="en-US" sz="3200" dirty="0"/>
           </a:p>
@@ -14307,7 +14303,7 @@
             <a:pPr algn="ctr"/>
             <a:r>
               <a:rPr lang="en-US" sz="1200" dirty="0" err="1" smtClean="0"/>
-              <a:t>islocked</a:t>
+              <a:t>smw</a:t>
             </a:r>
             <a:r>
               <a:rPr lang="en-US" sz="1200" dirty="0" smtClean="0"/>
@@ -15279,7 +15275,7 @@
             <a:pPr algn="ctr"/>
             <a:r>
               <a:rPr lang="en-US" sz="1200" dirty="0" err="1" smtClean="0"/>
-              <a:t>islocked</a:t>
+              <a:t>smw</a:t>
             </a:r>
             <a:r>
               <a:rPr lang="en-US" sz="1200" dirty="0" smtClean="0"/>
@@ -16269,7 +16265,7 @@
         </p:nvSpPr>
         <p:spPr>
           <a:xfrm>
-            <a:off x="6372059" y="3688556"/>
+            <a:off x="6358173" y="3681766"/>
             <a:ext cx="957027" cy="197644"/>
           </a:xfrm>
           <a:prstGeom prst="rect">
@@ -16307,7 +16303,7 @@
             <a:pPr algn="ctr"/>
             <a:r>
               <a:rPr lang="en-US" sz="1200" dirty="0" err="1" smtClean="0"/>
-              <a:t>islocked</a:t>
+              <a:t>smw</a:t>
             </a:r>
             <a:r>
               <a:rPr lang="en-US" sz="1200" dirty="0" smtClean="0"/>
@@ -16403,7 +16399,7 @@
             <a:pPr algn="ctr"/>
             <a:r>
               <a:rPr lang="en-US" sz="1200" dirty="0" err="1" smtClean="0"/>
-              <a:t>islocked</a:t>
+              <a:t>smw</a:t>
             </a:r>
             <a:r>
               <a:rPr lang="en-US" sz="1200" dirty="0" smtClean="0"/>
@@ -17099,6 +17095,30 @@
             <a:endParaRPr lang="en-US" sz="1600" dirty="0" smtClean="0"/>
           </a:p>
           <a:p>
+            <a:r>
+              <a:rPr lang="en-US" sz="1800" dirty="0" smtClean="0"/>
+              <a:t>Post on Concurrency Freaks:</a:t>
+            </a:r>
+          </a:p>
+          <a:p>
+            <a:pPr marL="365760" lvl="1" indent="0">
+              <a:buNone/>
+            </a:pPr>
+            <a:r>
+              <a:rPr lang="en-US" sz="1600" dirty="0">
+                <a:hlinkClick r:id="rId4"/>
+              </a:rPr>
+              <a:t>http://</a:t>
+            </a:r>
+            <a:r>
+              <a:rPr lang="en-US" sz="1600" dirty="0" smtClean="0">
+                <a:hlinkClick r:id="rId4"/>
+              </a:rPr>
+              <a:t>concurrencyfreaks.com/2014/06/clh-reader-writer-lock.html</a:t>
+            </a:r>
+            <a:endParaRPr lang="en-US" sz="1600" dirty="0" smtClean="0"/>
+          </a:p>
+          <a:p>
             <a:endParaRPr lang="en-US" sz="1800" dirty="0"/>
           </a:p>
         </p:txBody>
@@ -17186,13 +17206,8 @@
           <a:p>
             <a:r>
               <a:rPr lang="en-US" sz="1600" dirty="0" smtClean="0"/>
-              <a:t>It’s a Reader-Writer Lock based on the </a:t>
+              <a:t>It’s a Reader-Writer Lock based on the CLH lock.</a:t>
             </a:r>
-            <a:r>
-              <a:rPr lang="en-US" sz="1600" dirty="0" smtClean="0"/>
-              <a:t>CLH lock.</a:t>
-            </a:r>
-            <a:endParaRPr lang="en-US" sz="1600" dirty="0" smtClean="0"/>
           </a:p>
           <a:p>
             <a:endParaRPr lang="en-US" sz="1600" dirty="0" smtClean="0"/>
@@ -17508,60 +17523,6 @@
           <a:chExt cx="0" cy="0"/>
         </a:xfrm>
       </p:grpSpPr>
-      <p:pic>
-        <p:nvPicPr>
-          <p:cNvPr id="2050" name="Picture 2"/>
-          <p:cNvPicPr>
-            <a:picLocks noChangeAspect="1" noChangeArrowheads="1"/>
-          </p:cNvPicPr>
-          <p:nvPr/>
-        </p:nvPicPr>
-        <p:blipFill>
-          <a:blip r:embed="rId2">
-            <a:extLst>
-              <a:ext uri="{28A0092B-C50C-407E-A947-70E740481C1C}">
-                <a14:useLocalDpi xmlns:a14="http://schemas.microsoft.com/office/drawing/2010/main" val="0"/>
-              </a:ext>
-            </a:extLst>
-          </a:blip>
-          <a:srcRect/>
-          <a:stretch>
-            <a:fillRect/>
-          </a:stretch>
-        </p:blipFill>
-        <p:spPr bwMode="auto">
-          <a:xfrm>
-            <a:off x="0" y="1905000"/>
-            <a:ext cx="6172200" cy="4608167"/>
-          </a:xfrm>
-          <a:prstGeom prst="rect">
-            <a:avLst/>
-          </a:prstGeom>
-          <a:noFill/>
-          <a:ln>
-            <a:noFill/>
-          </a:ln>
-          <a:extLst>
-            <a:ext uri="{909E8E84-426E-40DD-AFC4-6F175D3DCCD1}">
-              <a14:hiddenFill xmlns:a14="http://schemas.microsoft.com/office/drawing/2010/main">
-                <a:solidFill>
-                  <a:schemeClr val="accent1"/>
-                </a:solidFill>
-              </a14:hiddenFill>
-            </a:ext>
-            <a:ext uri="{91240B29-F687-4F45-9708-019B960494DF}">
-              <a14:hiddenLine xmlns:a14="http://schemas.microsoft.com/office/drawing/2010/main" w="9525">
-                <a:solidFill>
-                  <a:schemeClr val="tx1"/>
-                </a:solidFill>
-                <a:miter lim="800000"/>
-                <a:headEnd/>
-                <a:tailEnd/>
-              </a14:hiddenLine>
-            </a:ext>
-          </a:extLst>
-        </p:spPr>
-      </p:pic>
       <p:sp>
         <p:nvSpPr>
           <p:cNvPr id="2" name="Title 1"/>
@@ -17584,7 +17545,7 @@
                 <a:latin typeface="Consolas" panose="020B0609020204030204" pitchFamily="49" charset="0"/>
                 <a:cs typeface="Consolas" panose="020B0609020204030204" pitchFamily="49" charset="0"/>
               </a:rPr>
-              <a:t>exchg_rwlock_readlock</a:t>
+              <a:t>clh_rwlock_readlock</a:t>
             </a:r>
             <a:r>
               <a:rPr lang="en-US" dirty="0" smtClean="0">
@@ -17698,11 +17659,7 @@
             </a:r>
             <a:r>
               <a:rPr lang="en-US" sz="1600" dirty="0" smtClean="0"/>
-              <a:t> </a:t>
-            </a:r>
-            <a:r>
-              <a:rPr lang="en-US" sz="1600" dirty="0" smtClean="0"/>
-              <a:t>to 0 so that the next thread can go in, assuming it is a Reader.</a:t>
+              <a:t> to 0 so that the next thread can go in, assuming it is a Reader.</a:t>
             </a:r>
           </a:p>
           <a:p>
@@ -17745,6 +17702,60 @@
           </a:p>
         </p:txBody>
       </p:sp>
+      <p:pic>
+        <p:nvPicPr>
+          <p:cNvPr id="1026" name="Picture 2"/>
+          <p:cNvPicPr>
+            <a:picLocks noChangeAspect="1" noChangeArrowheads="1"/>
+          </p:cNvPicPr>
+          <p:nvPr/>
+        </p:nvPicPr>
+        <p:blipFill>
+          <a:blip r:embed="rId2">
+            <a:extLst>
+              <a:ext uri="{28A0092B-C50C-407E-A947-70E740481C1C}">
+                <a14:useLocalDpi xmlns:a14="http://schemas.microsoft.com/office/drawing/2010/main" val="0"/>
+              </a:ext>
+            </a:extLst>
+          </a:blip>
+          <a:srcRect/>
+          <a:stretch>
+            <a:fillRect/>
+          </a:stretch>
+        </p:blipFill>
+        <p:spPr bwMode="auto">
+          <a:xfrm>
+            <a:off x="-5281" y="2019678"/>
+            <a:ext cx="5872681" cy="4838322"/>
+          </a:xfrm>
+          <a:prstGeom prst="rect">
+            <a:avLst/>
+          </a:prstGeom>
+          <a:noFill/>
+          <a:ln>
+            <a:noFill/>
+          </a:ln>
+          <a:extLst>
+            <a:ext uri="{909E8E84-426E-40DD-AFC4-6F175D3DCCD1}">
+              <a14:hiddenFill xmlns:a14="http://schemas.microsoft.com/office/drawing/2010/main">
+                <a:solidFill>
+                  <a:schemeClr val="accent1"/>
+                </a:solidFill>
+              </a14:hiddenFill>
+            </a:ext>
+            <a:ext uri="{91240B29-F687-4F45-9708-019B960494DF}">
+              <a14:hiddenLine xmlns:a14="http://schemas.microsoft.com/office/drawing/2010/main" w="9525">
+                <a:solidFill>
+                  <a:schemeClr val="tx1"/>
+                </a:solidFill>
+                <a:miter lim="800000"/>
+                <a:headEnd/>
+                <a:tailEnd/>
+              </a14:hiddenLine>
+            </a:ext>
+          </a:extLst>
+        </p:spPr>
+      </p:pic>
     </p:spTree>
     <p:extLst>
       <p:ext uri="{BB962C8B-B14F-4D97-AF65-F5344CB8AC3E}">
@@ -17782,6 +17793,60 @@
           <a:chExt cx="0" cy="0"/>
         </a:xfrm>
       </p:grpSpPr>
+      <p:pic>
+        <p:nvPicPr>
+          <p:cNvPr id="2050" name="Picture 2"/>
+          <p:cNvPicPr>
+            <a:picLocks noChangeAspect="1" noChangeArrowheads="1"/>
+          </p:cNvPicPr>
+          <p:nvPr/>
+        </p:nvPicPr>
+        <p:blipFill>
+          <a:blip r:embed="rId2">
+            <a:extLst>
+              <a:ext uri="{28A0092B-C50C-407E-A947-70E740481C1C}">
+                <a14:useLocalDpi xmlns:a14="http://schemas.microsoft.com/office/drawing/2010/main" val="0"/>
+              </a:ext>
+            </a:extLst>
+          </a:blip>
+          <a:srcRect/>
+          <a:stretch>
+            <a:fillRect/>
+          </a:stretch>
+        </p:blipFill>
+        <p:spPr bwMode="auto">
+          <a:xfrm>
+            <a:off x="1" y="2133599"/>
+            <a:ext cx="5877249" cy="4724399"/>
+          </a:xfrm>
+          <a:prstGeom prst="rect">
+            <a:avLst/>
+          </a:prstGeom>
+          <a:noFill/>
+          <a:ln>
+            <a:noFill/>
+          </a:ln>
+          <a:extLst>
+            <a:ext uri="{909E8E84-426E-40DD-AFC4-6F175D3DCCD1}">
+              <a14:hiddenFill xmlns:a14="http://schemas.microsoft.com/office/drawing/2010/main">
+                <a:solidFill>
+                  <a:schemeClr val="accent1"/>
+                </a:solidFill>
+              </a14:hiddenFill>
+            </a:ext>
+            <a:ext uri="{91240B29-F687-4F45-9708-019B960494DF}">
+              <a14:hiddenLine xmlns:a14="http://schemas.microsoft.com/office/drawing/2010/main" w="9525">
+                <a:solidFill>
+                  <a:schemeClr val="tx1"/>
+                </a:solidFill>
+                <a:miter lim="800000"/>
+                <a:headEnd/>
+                <a:tailEnd/>
+              </a14:hiddenLine>
+            </a:ext>
+          </a:extLst>
+        </p:spPr>
+      </p:pic>
       <p:sp>
         <p:nvSpPr>
           <p:cNvPr id="2" name="Title 1"/>
@@ -17804,7 +17869,7 @@
                 <a:latin typeface="Consolas" panose="020B0609020204030204" pitchFamily="49" charset="0"/>
                 <a:cs typeface="Consolas" panose="020B0609020204030204" pitchFamily="49" charset="0"/>
               </a:rPr>
-              <a:t>exchg_rwlock_writelock</a:t>
+              <a:t>clh_rwlock_writelock</a:t>
             </a:r>
             <a:r>
               <a:rPr lang="en-US" dirty="0" smtClean="0">
@@ -17863,11 +17928,22 @@
                 <a:latin typeface="Consolas" panose="020B0609020204030204" pitchFamily="49" charset="0"/>
                 <a:cs typeface="Consolas" panose="020B0609020204030204" pitchFamily="49" charset="0"/>
               </a:rPr>
-              <a:t>islocked</a:t>
+              <a:t>succ_must_wait</a:t>
+            </a:r>
+            <a:r>
+              <a:rPr lang="en-US" sz="1400" dirty="0" smtClean="0">
+                <a:latin typeface="Consolas" panose="020B0609020204030204" pitchFamily="49" charset="0"/>
+                <a:cs typeface="Consolas" panose="020B0609020204030204" pitchFamily="49" charset="0"/>
+              </a:rPr>
+              <a:t> </a:t>
             </a:r>
             <a:r>
               <a:rPr lang="en-US" sz="1400" dirty="0" smtClean="0"/>
-              <a:t> to zero. If the previous is a Writer, then this will happen only when the Writer calls </a:t>
+              <a:t>to </a:t>
+            </a:r>
+            <a:r>
+              <a:rPr lang="en-US" sz="1400" dirty="0" smtClean="0"/>
+              <a:t>zero. If the previous is a Writer, then this will happen only when the Writer calls </a:t>
             </a:r>
             <a:r>
               <a:rPr lang="en-US" sz="1400" dirty="0" smtClean="0">
@@ -17881,15 +17957,26 @@
               <a:t>, but if the previous is a Reader then it will set </a:t>
             </a:r>
             <a:r>
-              <a:rPr lang="en-US" sz="1400" dirty="0" err="1" smtClean="0">
+              <a:rPr lang="en-US" sz="1400" dirty="0" err="1">
                 <a:latin typeface="Consolas" panose="020B0609020204030204" pitchFamily="49" charset="0"/>
                 <a:cs typeface="Consolas" panose="020B0609020204030204" pitchFamily="49" charset="0"/>
               </a:rPr>
-              <a:t>islocked</a:t>
+              <a:t>succ_must_wait</a:t>
+            </a:r>
+            <a:r>
+              <a:rPr lang="en-US" sz="1400" dirty="0">
+                <a:latin typeface="Consolas" panose="020B0609020204030204" pitchFamily="49" charset="0"/>
+                <a:cs typeface="Consolas" panose="020B0609020204030204" pitchFamily="49" charset="0"/>
+              </a:rPr>
+              <a:t> </a:t>
             </a:r>
             <a:r>
               <a:rPr lang="en-US" sz="1400" dirty="0" smtClean="0"/>
-              <a:t> to zero before it lets go of the lock, so the Writer must wait also for the </a:t>
+              <a:t>to </a:t>
+            </a:r>
+            <a:r>
+              <a:rPr lang="en-US" sz="1400" dirty="0" smtClean="0"/>
+              <a:t>zero before it lets go of the lock, so the Writer must wait also for the </a:t>
             </a:r>
             <a:r>
               <a:rPr lang="en-US" sz="1400" dirty="0" err="1" smtClean="0">
@@ -17909,60 +17996,6 @@
           </a:p>
         </p:txBody>
       </p:sp>
-      <p:pic>
-        <p:nvPicPr>
-          <p:cNvPr id="3074" name="Picture 2"/>
-          <p:cNvPicPr>
-            <a:picLocks noChangeAspect="1" noChangeArrowheads="1"/>
-          </p:cNvPicPr>
-          <p:nvPr/>
-        </p:nvPicPr>
-        <p:blipFill>
-          <a:blip r:embed="rId2">
-            <a:extLst>
-              <a:ext uri="{28A0092B-C50C-407E-A947-70E740481C1C}">
-                <a14:useLocalDpi xmlns:a14="http://schemas.microsoft.com/office/drawing/2010/main" val="0"/>
-              </a:ext>
-            </a:extLst>
-          </a:blip>
-          <a:srcRect/>
-          <a:stretch>
-            <a:fillRect/>
-          </a:stretch>
-        </p:blipFill>
-        <p:spPr bwMode="auto">
-          <a:xfrm>
-            <a:off x="0" y="1810483"/>
-            <a:ext cx="5715000" cy="5047517"/>
-          </a:xfrm>
-          <a:prstGeom prst="rect">
-            <a:avLst/>
-          </a:prstGeom>
-          <a:noFill/>
-          <a:ln>
-            <a:noFill/>
-          </a:ln>
-          <a:extLst>
-            <a:ext uri="{909E8E84-426E-40DD-AFC4-6F175D3DCCD1}">
-              <a14:hiddenFill xmlns:a14="http://schemas.microsoft.com/office/drawing/2010/main">
-                <a:solidFill>
-                  <a:schemeClr val="accent1"/>
-                </a:solidFill>
-              </a14:hiddenFill>
-            </a:ext>
-            <a:ext uri="{91240B29-F687-4F45-9708-019B960494DF}">
-              <a14:hiddenLine xmlns:a14="http://schemas.microsoft.com/office/drawing/2010/main" w="9525">
-                <a:solidFill>
-                  <a:schemeClr val="tx1"/>
-                </a:solidFill>
-                <a:miter lim="800000"/>
-                <a:headEnd/>
-                <a:tailEnd/>
-              </a14:hiddenLine>
-            </a:ext>
-          </a:extLst>
-        </p:spPr>
-      </p:pic>
     </p:spTree>
     <p:extLst>
       <p:ext uri="{BB962C8B-B14F-4D97-AF65-F5344CB8AC3E}">
@@ -18258,7 +18291,7 @@
             <a:pPr algn="ctr"/>
             <a:r>
               <a:rPr lang="en-US" sz="1200" dirty="0" err="1" smtClean="0"/>
-              <a:t>islocked</a:t>
+              <a:t>smw</a:t>
             </a:r>
             <a:r>
               <a:rPr lang="en-US" sz="1200" dirty="0" smtClean="0"/>
@@ -18488,7 +18521,7 @@
             <a:pPr algn="ctr"/>
             <a:r>
               <a:rPr lang="en-US" sz="1200" dirty="0" err="1" smtClean="0"/>
-              <a:t>islocked</a:t>
+              <a:t>smw</a:t>
             </a:r>
             <a:r>
               <a:rPr lang="en-US" sz="1200" dirty="0" smtClean="0"/>
@@ -22315,7 +22348,7 @@
         </p:nvSpPr>
         <p:spPr>
           <a:xfrm>
-            <a:off x="1997954" y="3688556"/>
+            <a:off x="1995912" y="3688556"/>
             <a:ext cx="957027" cy="197644"/>
           </a:xfrm>
           <a:prstGeom prst="rect">
@@ -22353,7 +22386,7 @@
             <a:pPr algn="ctr"/>
             <a:r>
               <a:rPr lang="en-US" sz="1200" dirty="0" err="1" smtClean="0"/>
-              <a:t>islocked</a:t>
+              <a:t>smw</a:t>
             </a:r>
             <a:r>
               <a:rPr lang="en-US" sz="1200" dirty="0" smtClean="0"/>
@@ -22449,7 +22482,7 @@
             <a:pPr algn="ctr"/>
             <a:r>
               <a:rPr lang="en-US" sz="1200" dirty="0" err="1" smtClean="0"/>
-              <a:t>islocked</a:t>
+              <a:t>smw</a:t>
             </a:r>
             <a:r>
               <a:rPr lang="en-US" sz="1200" dirty="0" smtClean="0"/>
@@ -23461,6 +23494,82 @@
               <a:t>2</a:t>
             </a:r>
             <a:endParaRPr lang="en-US" b="1" dirty="0">
+              <a:latin typeface="Consolas" panose="020B0609020204030204" pitchFamily="49" charset="0"/>
+              <a:cs typeface="Consolas" panose="020B0609020204030204" pitchFamily="49" charset="0"/>
+            </a:endParaRPr>
+          </a:p>
+        </p:txBody>
+      </p:sp>
+      <p:sp>
+        <p:nvSpPr>
+          <p:cNvPr id="3" name="TextBox 2"/>
+          <p:cNvSpPr txBox="1"/>
+          <p:nvPr/>
+        </p:nvSpPr>
+        <p:spPr>
+          <a:xfrm>
+            <a:off x="6919944" y="5676730"/>
+            <a:ext cx="2071656" cy="276999"/>
+          </a:xfrm>
+          <a:prstGeom prst="rect">
+            <a:avLst/>
+          </a:prstGeom>
+          <a:noFill/>
+        </p:spPr>
+        <p:txBody>
+          <a:bodyPr wrap="square" rtlCol="0">
+            <a:spAutoFit/>
+          </a:bodyPr>
+          <a:lstStyle/>
+          <a:p>
+            <a:r>
+              <a:rPr lang="en-US" sz="1200" dirty="0" err="1">
+                <a:solidFill>
+                  <a:schemeClr val="bg1">
+                    <a:lumMod val="50000"/>
+                  </a:schemeClr>
+                </a:solidFill>
+              </a:rPr>
+              <a:t>s</a:t>
+            </a:r>
+            <a:r>
+              <a:rPr lang="en-US" sz="1200" dirty="0" err="1" smtClean="0">
+                <a:solidFill>
+                  <a:schemeClr val="bg1">
+                    <a:lumMod val="50000"/>
+                  </a:schemeClr>
+                </a:solidFill>
+              </a:rPr>
+              <a:t>mw</a:t>
+            </a:r>
+            <a:r>
+              <a:rPr lang="en-US" sz="1200" dirty="0" smtClean="0">
+                <a:solidFill>
+                  <a:schemeClr val="bg1">
+                    <a:lumMod val="50000"/>
+                  </a:schemeClr>
+                </a:solidFill>
+              </a:rPr>
+              <a:t> is </a:t>
+            </a:r>
+            <a:r>
+              <a:rPr lang="en-US" sz="1200" dirty="0" err="1" smtClean="0">
+                <a:solidFill>
+                  <a:schemeClr val="bg1">
+                    <a:lumMod val="50000"/>
+                  </a:schemeClr>
+                </a:solidFill>
+                <a:latin typeface="Consolas" panose="020B0609020204030204" pitchFamily="49" charset="0"/>
+                <a:cs typeface="Consolas" panose="020B0609020204030204" pitchFamily="49" charset="0"/>
+              </a:rPr>
+              <a:t>succ_must_wait</a:t>
+            </a:r>
+            <a:endParaRPr lang="en-US" sz="1200" dirty="0">
+              <a:solidFill>
+                <a:schemeClr val="bg1">
+                  <a:lumMod val="50000"/>
+                </a:schemeClr>
+              </a:solidFill>
               <a:latin typeface="Consolas" panose="020B0609020204030204" pitchFamily="49" charset="0"/>
               <a:cs typeface="Consolas" panose="020B0609020204030204" pitchFamily="49" charset="0"/>
             </a:endParaRPr>
@@ -29025,7 +29134,7 @@
             <a:pPr algn="ctr"/>
             <a:r>
               <a:rPr lang="en-US" sz="1200" dirty="0" err="1" smtClean="0"/>
-              <a:t>islocked</a:t>
+              <a:t>smw</a:t>
             </a:r>
             <a:r>
               <a:rPr lang="en-US" sz="1200" dirty="0" smtClean="0"/>
@@ -29085,7 +29194,7 @@
             <a:pPr algn="ctr"/>
             <a:r>
               <a:rPr lang="en-US" sz="1200" dirty="0" err="1" smtClean="0"/>
-              <a:t>islocked</a:t>
+              <a:t>smw</a:t>
             </a:r>
             <a:r>
               <a:rPr lang="en-US" sz="1200" dirty="0" smtClean="0"/>
@@ -30019,7 +30128,7 @@
         </p:nvSpPr>
         <p:spPr>
           <a:xfrm>
-            <a:off x="3475961" y="3679452"/>
+            <a:off x="3484043" y="3688556"/>
             <a:ext cx="957027" cy="197644"/>
           </a:xfrm>
           <a:prstGeom prst="rect">
@@ -30057,7 +30166,7 @@
             <a:pPr algn="ctr"/>
             <a:r>
               <a:rPr lang="en-US" sz="1200" dirty="0" err="1" smtClean="0"/>
-              <a:t>islocked</a:t>
+              <a:t>smw</a:t>
             </a:r>
             <a:r>
               <a:rPr lang="en-US" sz="1200" dirty="0" smtClean="0"/>
@@ -34166,7 +34275,7 @@
             <a:pPr algn="ctr"/>
             <a:r>
               <a:rPr lang="en-US" sz="1200" dirty="0" err="1" smtClean="0"/>
-              <a:t>islocked</a:t>
+              <a:t>smw</a:t>
             </a:r>
             <a:r>
               <a:rPr lang="en-US" sz="1200" dirty="0" smtClean="0"/>
@@ -35179,7 +35288,7 @@
             <a:pPr algn="ctr"/>
             <a:r>
               <a:rPr lang="en-US" sz="1200" dirty="0" err="1" smtClean="0"/>
-              <a:t>islocked</a:t>
+              <a:t>smw</a:t>
             </a:r>
             <a:r>
               <a:rPr lang="en-US" sz="1200" dirty="0" smtClean="0"/>
@@ -37503,7 +37612,7 @@
             <a:pPr algn="ctr"/>
             <a:r>
               <a:rPr lang="en-US" sz="1200" dirty="0" err="1" smtClean="0"/>
-              <a:t>islocked</a:t>
+              <a:t>smw</a:t>
             </a:r>
             <a:r>
               <a:rPr lang="en-US" sz="1200" dirty="0" smtClean="0"/>
@@ -38475,7 +38584,7 @@
             <a:pPr algn="ctr"/>
             <a:r>
               <a:rPr lang="en-US" sz="1200" dirty="0" err="1" smtClean="0"/>
-              <a:t>islocked</a:t>
+              <a:t>smw</a:t>
             </a:r>
             <a:r>
               <a:rPr lang="en-US" sz="1200" dirty="0" smtClean="0"/>
@@ -39488,7 +39597,7 @@
             <a:pPr algn="ctr"/>
             <a:r>
               <a:rPr lang="en-US" sz="1200" dirty="0" err="1" smtClean="0"/>
-              <a:t>islocked</a:t>
+              <a:t>smw</a:t>
             </a:r>
             <a:r>
               <a:rPr lang="en-US" sz="1200" dirty="0" smtClean="0"/>
@@ -40478,7 +40587,7 @@
         </p:nvSpPr>
         <p:spPr>
           <a:xfrm>
-            <a:off x="4997390" y="3679452"/>
+            <a:off x="4979120" y="3688556"/>
             <a:ext cx="957027" cy="197644"/>
           </a:xfrm>
           <a:prstGeom prst="rect">
@@ -40516,7 +40625,7 @@
             <a:pPr algn="ctr"/>
             <a:r>
               <a:rPr lang="en-US" sz="1200" dirty="0" err="1" smtClean="0"/>
-              <a:t>islocked</a:t>
+              <a:t>smw</a:t>
             </a:r>
             <a:r>
               <a:rPr lang="en-US" sz="1200" dirty="0" smtClean="0"/>

</xml_diff>

<commit_message>
Added Java implementation of lock-free list
This new linked list allows for list traversals using relaxed atomics
(aka weak atomics)
</commit_message>
<xml_diff>
--- a/Presentations/CLH-RWLock.pptx
+++ b/Presentations/CLH-RWLock.pptx
@@ -2875,7 +2875,7 @@
             <a:fld id="{1D8BD707-D9CF-40AE-B4C6-C98DA3205C09}" type="datetimeFigureOut">
               <a:rPr lang="en-US" smtClean="0"/>
               <a:pPr/>
-              <a:t>6/8/2014</a:t>
+              <a:t>6/9/2014</a:t>
             </a:fld>
             <a:endParaRPr lang="en-US"/>
           </a:p>
@@ -3162,7 +3162,7 @@
             <a:fld id="{1D8BD707-D9CF-40AE-B4C6-C98DA3205C09}" type="datetimeFigureOut">
               <a:rPr lang="en-US" smtClean="0"/>
               <a:pPr/>
-              <a:t>6/8/2014</a:t>
+              <a:t>6/9/2014</a:t>
             </a:fld>
             <a:endParaRPr lang="en-US"/>
           </a:p>
@@ -3339,7 +3339,7 @@
             <a:fld id="{1D8BD707-D9CF-40AE-B4C6-C98DA3205C09}" type="datetimeFigureOut">
               <a:rPr lang="en-US" smtClean="0"/>
               <a:pPr/>
-              <a:t>6/8/2014</a:t>
+              <a:t>6/9/2014</a:t>
             </a:fld>
             <a:endParaRPr lang="en-US"/>
           </a:p>
@@ -3506,7 +3506,7 @@
             <a:fld id="{1D8BD707-D9CF-40AE-B4C6-C98DA3205C09}" type="datetimeFigureOut">
               <a:rPr lang="en-US" smtClean="0"/>
               <a:pPr/>
-              <a:t>6/8/2014</a:t>
+              <a:t>6/9/2014</a:t>
             </a:fld>
             <a:endParaRPr lang="en-US"/>
           </a:p>
@@ -3749,7 +3749,7 @@
             <a:fld id="{1D8BD707-D9CF-40AE-B4C6-C98DA3205C09}" type="datetimeFigureOut">
               <a:rPr lang="en-US" smtClean="0"/>
               <a:pPr/>
-              <a:t>6/8/2014</a:t>
+              <a:t>6/9/2014</a:t>
             </a:fld>
             <a:endParaRPr lang="en-US"/>
           </a:p>
@@ -3864,7 +3864,7 @@
             <a:fld id="{1D8BD707-D9CF-40AE-B4C6-C98DA3205C09}" type="datetimeFigureOut">
               <a:rPr lang="en-US" smtClean="0"/>
               <a:pPr/>
-              <a:t>6/8/2014</a:t>
+              <a:t>6/9/2014</a:t>
             </a:fld>
             <a:endParaRPr lang="en-US"/>
           </a:p>
@@ -4405,7 +4405,7 @@
             <a:fld id="{1D8BD707-D9CF-40AE-B4C6-C98DA3205C09}" type="datetimeFigureOut">
               <a:rPr lang="en-US" smtClean="0"/>
               <a:pPr/>
-              <a:t>6/8/2014</a:t>
+              <a:t>6/9/2014</a:t>
             </a:fld>
             <a:endParaRPr lang="en-US"/>
           </a:p>
@@ -4520,7 +4520,7 @@
             <a:fld id="{1D8BD707-D9CF-40AE-B4C6-C98DA3205C09}" type="datetimeFigureOut">
               <a:rPr lang="en-US" smtClean="0"/>
               <a:pPr/>
-              <a:t>6/8/2014</a:t>
+              <a:t>6/9/2014</a:t>
             </a:fld>
             <a:endParaRPr lang="en-US"/>
           </a:p>
@@ -4612,7 +4612,7 @@
             <a:fld id="{1D8BD707-D9CF-40AE-B4C6-C98DA3205C09}" type="datetimeFigureOut">
               <a:rPr lang="en-US" smtClean="0"/>
               <a:pPr/>
-              <a:t>6/8/2014</a:t>
+              <a:t>6/9/2014</a:t>
             </a:fld>
             <a:endParaRPr lang="en-US"/>
           </a:p>
@@ -7265,7 +7265,7 @@
             <a:fld id="{1D8BD707-D9CF-40AE-B4C6-C98DA3205C09}" type="datetimeFigureOut">
               <a:rPr lang="en-US" smtClean="0"/>
               <a:pPr/>
-              <a:t>6/8/2014</a:t>
+              <a:t>6/9/2014</a:t>
             </a:fld>
             <a:endParaRPr lang="en-US"/>
           </a:p>
@@ -10479,7 +10479,7 @@
             <a:fld id="{1D8BD707-D9CF-40AE-B4C6-C98DA3205C09}" type="datetimeFigureOut">
               <a:rPr lang="en-US" smtClean="0"/>
               <a:pPr/>
-              <a:t>6/8/2014</a:t>
+              <a:t>6/9/2014</a:t>
             </a:fld>
             <a:endParaRPr lang="en-US"/>
           </a:p>
@@ -13303,7 +13303,7 @@
             <a:fld id="{1D8BD707-D9CF-40AE-B4C6-C98DA3205C09}" type="datetimeFigureOut">
               <a:rPr lang="en-US" smtClean="0"/>
               <a:pPr/>
-              <a:t>6/8/2014</a:t>
+              <a:t>6/9/2014</a:t>
             </a:fld>
             <a:endParaRPr lang="en-US"/>
           </a:p>
@@ -17036,7 +17036,7 @@
         <p:spPr>
           <a:xfrm>
             <a:off x="762000" y="2286000"/>
-            <a:ext cx="8077200" cy="3508977"/>
+            <a:ext cx="8077200" cy="3733800"/>
           </a:xfrm>
         </p:spPr>
         <p:txBody>
@@ -17060,36 +17060,36 @@
               <a:buNone/>
             </a:pPr>
             <a:r>
-              <a:rPr lang="en-US" sz="1200" dirty="0">
+              <a:rPr lang="en-US" sz="1400" dirty="0">
                 <a:hlinkClick r:id="rId2"/>
               </a:rPr>
               <a:t>https://</a:t>
             </a:r>
             <a:r>
-              <a:rPr lang="en-US" sz="1200" dirty="0" smtClean="0">
+              <a:rPr lang="en-US" sz="1400" dirty="0" smtClean="0">
                 <a:hlinkClick r:id="rId2"/>
               </a:rPr>
-              <a:t>github.com/pramalhe/ConcurrencyFreaks/blob/master/C11/locks/exchg_rwlock.c</a:t>
+              <a:t>github.com/pramalhe/ConcurrencyFreaks/blob/master/C11/locks/clh_rwlock.c</a:t>
             </a:r>
-            <a:endParaRPr lang="en-US" sz="1200" dirty="0" smtClean="0"/>
+            <a:endParaRPr lang="en-US" sz="1400" dirty="0" smtClean="0"/>
           </a:p>
           <a:p>
             <a:pPr marL="109728" indent="0">
               <a:buNone/>
             </a:pPr>
             <a:r>
-              <a:rPr lang="en-US" sz="1200" dirty="0">
+              <a:rPr lang="en-US" sz="1400" dirty="0">
                 <a:hlinkClick r:id="rId3"/>
               </a:rPr>
               <a:t>https://</a:t>
             </a:r>
             <a:r>
-              <a:rPr lang="en-US" sz="1200" dirty="0" smtClean="0">
+              <a:rPr lang="en-US" sz="1400" dirty="0" smtClean="0">
                 <a:hlinkClick r:id="rId3"/>
               </a:rPr>
-              <a:t>github.com/pramalhe/ConcurrencyFreaks/blob/master/C11/locks/exchg_rwlock.h</a:t>
+              <a:t>github.com/pramalhe/ConcurrencyFreaks/blob/master/C11/locks/clh_rwlock.h</a:t>
             </a:r>
-            <a:endParaRPr lang="en-US" sz="1200" dirty="0" smtClean="0"/>
+            <a:endParaRPr lang="en-US" sz="1400" dirty="0" smtClean="0"/>
           </a:p>
           <a:p>
             <a:endParaRPr lang="en-US" sz="1600" dirty="0" smtClean="0"/>
@@ -17117,6 +17117,60 @@
               <a:t>concurrencyfreaks.com/2014/06/clh-reader-writer-lock.html</a:t>
             </a:r>
             <a:endParaRPr lang="en-US" sz="1600" dirty="0" smtClean="0"/>
+          </a:p>
+          <a:p>
+            <a:endParaRPr lang="en-US" sz="1800" dirty="0" smtClean="0"/>
+          </a:p>
+          <a:p>
+            <a:r>
+              <a:rPr lang="en-US" sz="1800" dirty="0" smtClean="0"/>
+              <a:t>CLH lock (slide 45)</a:t>
+            </a:r>
+          </a:p>
+          <a:p>
+            <a:pPr marL="365760" lvl="1" indent="0">
+              <a:buNone/>
+            </a:pPr>
+            <a:r>
+              <a:rPr lang="en-US" sz="1400" dirty="0">
+                <a:hlinkClick r:id="rId5"/>
+              </a:rPr>
+              <a:t>http://www.cs.rice.edu/~</a:t>
+            </a:r>
+            <a:r>
+              <a:rPr lang="en-US" sz="1400" dirty="0" smtClean="0">
+                <a:hlinkClick r:id="rId5"/>
+              </a:rPr>
+              <a:t>vs3/comp422/lecture-notes/comp422-lec19-s08-v1.pdf</a:t>
+            </a:r>
+            <a:endParaRPr lang="en-US" sz="1400" dirty="0" smtClean="0"/>
+          </a:p>
+          <a:p>
+            <a:endParaRPr lang="en-US" sz="1800" dirty="0"/>
+          </a:p>
+          <a:p>
+            <a:r>
+              <a:rPr lang="en-US" sz="1800" dirty="0" smtClean="0"/>
+              <a:t>C-RW-NP</a:t>
+            </a:r>
+          </a:p>
+          <a:p>
+            <a:pPr marL="365760" lvl="1" indent="0">
+              <a:buNone/>
+            </a:pPr>
+            <a:r>
+              <a:rPr lang="en-US" sz="1400" dirty="0">
+                <a:hlinkClick r:id="rId6"/>
+              </a:rPr>
+              <a:t>https://</a:t>
+            </a:r>
+            <a:r>
+              <a:rPr lang="en-US" sz="1400" dirty="0" smtClean="0">
+                <a:hlinkClick r:id="rId6"/>
+              </a:rPr>
+              <a:t>blogs.oracle.com/dave/resource/ppopp13-dice-NUMAAwareRWLocks.pdf</a:t>
+            </a:r>
+            <a:endParaRPr lang="en-US" sz="1400" dirty="0" smtClean="0"/>
           </a:p>
           <a:p>
             <a:endParaRPr lang="en-US" sz="1800" dirty="0"/>
@@ -17200,14 +17254,42 @@
         <p:spPr/>
         <p:txBody>
           <a:bodyPr>
-            <a:normAutofit fontScale="92500"/>
+            <a:normAutofit fontScale="92500" lnSpcReduction="20000"/>
           </a:bodyPr>
           <a:lstStyle/>
           <a:p>
             <a:r>
               <a:rPr lang="en-US" sz="1600" dirty="0" smtClean="0"/>
-              <a:t>It’s a Reader-Writer Lock based on the CLH lock.</a:t>
+              <a:t>It’s a Reader-Writer Lock based on the CLH </a:t>
             </a:r>
+            <a:r>
+              <a:rPr lang="en-US" sz="1600" dirty="0" smtClean="0"/>
+              <a:t>lock (</a:t>
+            </a:r>
+            <a:r>
+              <a:rPr lang="en-US" sz="1600" dirty="0" smtClean="0"/>
+              <a:t>one of its variants) </a:t>
+            </a:r>
+            <a:r>
+              <a:rPr lang="en-US" sz="1600" dirty="0" smtClean="0"/>
+              <a:t>and the C-RW-NP described in this paper:</a:t>
+            </a:r>
+          </a:p>
+          <a:p>
+            <a:pPr lvl="1"/>
+            <a:r>
+              <a:rPr lang="en-US" sz="1400" dirty="0">
+                <a:hlinkClick r:id="rId2"/>
+              </a:rPr>
+              <a:t>https://</a:t>
+            </a:r>
+            <a:r>
+              <a:rPr lang="en-US" sz="1400" dirty="0" smtClean="0">
+                <a:hlinkClick r:id="rId2"/>
+              </a:rPr>
+              <a:t>blogs.oracle.com/dave/resource/ppopp13-dice-NUMAAwareRWLocks.pdf</a:t>
+            </a:r>
+            <a:endParaRPr lang="en-US" sz="1400" dirty="0" smtClean="0"/>
           </a:p>
           <a:p>
             <a:endParaRPr lang="en-US" sz="1600" dirty="0" smtClean="0"/>
@@ -17939,11 +18021,7 @@
             </a:r>
             <a:r>
               <a:rPr lang="en-US" sz="1400" dirty="0" smtClean="0"/>
-              <a:t>to </a:t>
-            </a:r>
-            <a:r>
-              <a:rPr lang="en-US" sz="1400" dirty="0" smtClean="0"/>
-              <a:t>zero. If the previous is a Writer, then this will happen only when the Writer calls </a:t>
+              <a:t>to zero. If the previous is a Writer, then this will happen only when the Writer calls </a:t>
             </a:r>
             <a:r>
               <a:rPr lang="en-US" sz="1400" dirty="0" smtClean="0">
@@ -17972,11 +18050,7 @@
             </a:r>
             <a:r>
               <a:rPr lang="en-US" sz="1400" dirty="0" smtClean="0"/>
-              <a:t>to </a:t>
-            </a:r>
-            <a:r>
-              <a:rPr lang="en-US" sz="1400" dirty="0" smtClean="0"/>
-              <a:t>zero before it lets go of the lock, so the Writer must wait also for the </a:t>
+              <a:t>to zero before it lets go of the lock, so the Writer must wait also for the </a:t>
             </a:r>
             <a:r>
               <a:rPr lang="en-US" sz="1400" dirty="0" err="1" smtClean="0">

</xml_diff>